<commit_message>
correcoes e atualizacao pptx
</commit_message>
<xml_diff>
--- a/Exemplo_Flyweight/Apresentacao/DESIGN PATTERN Flyweight.pptx
+++ b/Exemplo_Flyweight/Apresentacao/DESIGN PATTERN Flyweight.pptx
@@ -15,23 +15,26 @@
     <p:sldId id="260" r:id="rId10"/>
     <p:sldId id="261" r:id="rId11"/>
     <p:sldId id="262" r:id="rId12"/>
+    <p:sldId id="263" r:id="rId13"/>
+    <p:sldId id="264" r:id="rId14"/>
+    <p:sldId id="265" r:id="rId15"/>
   </p:sldIdLst>
   <p:sldSz cy="5143500" cx="9144000"/>
   <p:notesSz cx="6858000" cy="9144000"/>
   <p:embeddedFontLst>
     <p:embeddedFont>
       <p:font typeface="Montserrat"/>
-      <p:regular r:id="rId13"/>
-      <p:bold r:id="rId14"/>
-      <p:italic r:id="rId15"/>
-      <p:boldItalic r:id="rId16"/>
+      <p:regular r:id="rId16"/>
+      <p:bold r:id="rId17"/>
+      <p:italic r:id="rId18"/>
+      <p:boldItalic r:id="rId19"/>
     </p:embeddedFont>
     <p:embeddedFont>
       <p:font typeface="Lato"/>
-      <p:regular r:id="rId17"/>
-      <p:bold r:id="rId18"/>
-      <p:italic r:id="rId19"/>
-      <p:boldItalic r:id="rId20"/>
+      <p:regular r:id="rId20"/>
+      <p:bold r:id="rId21"/>
+      <p:italic r:id="rId22"/>
+      <p:boldItalic r:id="rId23"/>
     </p:embeddedFont>
   </p:embeddedFontLst>
   <p:defaultTextStyle>
@@ -807,6 +810,105 @@
 </p:notes>
 </file>
 
+<file path=ppt/notesSlides/notesSlide10.xml><?xml version="1.0" encoding="utf-8"?>
+<p:notes xmlns:a="http://schemas.openxmlformats.org/drawingml/2006/main" xmlns:r="http://schemas.openxmlformats.org/officeDocument/2006/relationships" xmlns:mc="http://schemas.openxmlformats.org/markup-compatibility/2006" xmlns:mv="urn:schemas-microsoft-com:mac:vml" xmlns:p="http://schemas.openxmlformats.org/presentationml/2006/main" xmlns:c="http://schemas.openxmlformats.org/drawingml/2006/chart" xmlns:dgm="http://schemas.openxmlformats.org/drawingml/2006/diagram" xmlns:o="urn:schemas-microsoft-com:office:office" xmlns:v="urn:schemas-microsoft-com:vml" xmlns:pvml="urn:schemas-microsoft-com:office:powerpoint" xmlns:com="http://schemas.openxmlformats.org/drawingml/2006/compatibility" xmlns:p14="http://schemas.microsoft.com/office/powerpoint/2010/main" xmlns:p15="http://schemas.microsoft.com/office/powerpoint/2012/main" xmlns:ahyp="http://schemas.microsoft.com/office/drawing/2018/hyperlinkcolor" showMasterPhAnim="0" showMasterSp="0">
+  <p:cSld>
+    <p:spTree>
+      <p:nvGrpSpPr>
+        <p:cNvPr id="192" name="Shape 192"/>
+        <p:cNvGrpSpPr/>
+        <p:nvPr/>
+      </p:nvGrpSpPr>
+      <p:grpSpPr>
+        <a:xfrm>
+          <a:off x="0" y="0"/>
+          <a:ext cx="0" cy="0"/>
+          <a:chOff x="0" y="0"/>
+          <a:chExt cx="0" cy="0"/>
+        </a:xfrm>
+      </p:grpSpPr>
+      <p:sp>
+        <p:nvSpPr>
+          <p:cNvPr id="193" name="Google Shape;193;g20de7d97273_0_1:notes"/>
+          <p:cNvSpPr/>
+          <p:nvPr>
+            <p:ph idx="2" type="sldImg"/>
+          </p:nvPr>
+        </p:nvSpPr>
+        <p:spPr>
+          <a:xfrm>
+            <a:off x="381300" y="685800"/>
+            <a:ext cx="6096000" cy="3429000"/>
+          </a:xfrm>
+          <a:custGeom>
+            <a:rect b="b" l="l" r="r" t="t"/>
+            <a:pathLst>
+              <a:path extrusionOk="0" h="120000" w="120000">
+                <a:moveTo>
+                  <a:pt x="0" y="0"/>
+                </a:moveTo>
+                <a:lnTo>
+                  <a:pt x="120000" y="0"/>
+                </a:lnTo>
+                <a:lnTo>
+                  <a:pt x="120000" y="120000"/>
+                </a:lnTo>
+                <a:lnTo>
+                  <a:pt x="0" y="120000"/>
+                </a:lnTo>
+                <a:close/>
+              </a:path>
+            </a:pathLst>
+          </a:custGeom>
+        </p:spPr>
+      </p:sp>
+      <p:sp>
+        <p:nvSpPr>
+          <p:cNvPr id="194" name="Google Shape;194;g20de7d97273_0_1:notes"/>
+          <p:cNvSpPr txBox="1"/>
+          <p:nvPr>
+            <p:ph idx="1" type="body"/>
+          </p:nvPr>
+        </p:nvSpPr>
+        <p:spPr>
+          <a:xfrm>
+            <a:off x="685800" y="4343400"/>
+            <a:ext cx="5486400" cy="4114800"/>
+          </a:xfrm>
+          <a:prstGeom prst="rect">
+            <a:avLst/>
+          </a:prstGeom>
+        </p:spPr>
+        <p:txBody>
+          <a:bodyPr anchorCtr="0" anchor="t" bIns="91425" lIns="91425" spcFirstLastPara="1" rIns="91425" wrap="square" tIns="91425">
+            <a:noAutofit/>
+          </a:bodyPr>
+          <a:lstStyle/>
+          <a:p>
+            <a:pPr indent="0" lvl="0" marL="0" rtl="0" algn="l">
+              <a:spcBef>
+                <a:spcPts val="0"/>
+              </a:spcBef>
+              <a:spcAft>
+                <a:spcPts val="0"/>
+              </a:spcAft>
+              <a:buNone/>
+            </a:pPr>
+            <a:r>
+              <a:t/>
+            </a:r>
+            <a:endParaRPr/>
+          </a:p>
+        </p:txBody>
+      </p:sp>
+    </p:spTree>
+  </p:cSld>
+  <p:clrMapOvr>
+    <a:masterClrMapping/>
+  </p:clrMapOvr>
+</p:notes>
+</file>
+
 <file path=ppt/notesSlides/notesSlide2.xml><?xml version="1.0" encoding="utf-8"?>
 <p:notes xmlns:a="http://schemas.openxmlformats.org/drawingml/2006/main" xmlns:r="http://schemas.openxmlformats.org/officeDocument/2006/relationships" xmlns:mc="http://schemas.openxmlformats.org/markup-compatibility/2006" xmlns:mv="urn:schemas-microsoft-com:mac:vml" xmlns:p="http://schemas.openxmlformats.org/presentationml/2006/main" xmlns:c="http://schemas.openxmlformats.org/drawingml/2006/chart" xmlns:dgm="http://schemas.openxmlformats.org/drawingml/2006/diagram" xmlns:o="urn:schemas-microsoft-com:office:office" xmlns:v="urn:schemas-microsoft-com:vml" xmlns:pvml="urn:schemas-microsoft-com:office:powerpoint" xmlns:com="http://schemas.openxmlformats.org/drawingml/2006/compatibility" xmlns:p14="http://schemas.microsoft.com/office/powerpoint/2010/main" xmlns:p15="http://schemas.microsoft.com/office/powerpoint/2012/main" xmlns:ahyp="http://schemas.microsoft.com/office/drawing/2018/hyperlinkcolor" showMasterPhAnim="0" showMasterSp="0">
   <p:cSld>
@@ -1222,7 +1324,7 @@
       </p:grpSpPr>
       <p:sp>
         <p:nvSpPr>
-          <p:cNvPr id="162" name="Google Shape;162;g20de72deb0f_0_153:notes"/>
+          <p:cNvPr id="162" name="Google Shape;162;g2e1b24190b9_0_0:notes"/>
           <p:cNvSpPr/>
           <p:nvPr>
             <p:ph idx="2" type="sldImg"/>
@@ -1257,7 +1359,7 @@
       </p:sp>
       <p:sp>
         <p:nvSpPr>
-          <p:cNvPr id="163" name="Google Shape;163;g20de72deb0f_0_153:notes"/>
+          <p:cNvPr id="163" name="Google Shape;163;g2e1b24190b9_0_0:notes"/>
           <p:cNvSpPr txBox="1"/>
           <p:nvPr>
             <p:ph idx="1" type="body"/>
@@ -1307,7 +1409,7 @@
   <p:cSld>
     <p:spTree>
       <p:nvGrpSpPr>
-        <p:cNvPr id="172" name="Shape 172"/>
+        <p:cNvPr id="168" name="Shape 168"/>
         <p:cNvGrpSpPr/>
         <p:nvPr/>
       </p:nvGrpSpPr>
@@ -1321,7 +1423,7 @@
       </p:grpSpPr>
       <p:sp>
         <p:nvSpPr>
-          <p:cNvPr id="173" name="Google Shape;173;g20de7d97273_0_1:notes"/>
+          <p:cNvPr id="169" name="Google Shape;169;g2e1b24190b9_0_7:notes"/>
           <p:cNvSpPr/>
           <p:nvPr>
             <p:ph idx="2" type="sldImg"/>
@@ -1356,7 +1458,205 @@
       </p:sp>
       <p:sp>
         <p:nvSpPr>
-          <p:cNvPr id="174" name="Google Shape;174;g20de7d97273_0_1:notes"/>
+          <p:cNvPr id="170" name="Google Shape;170;g2e1b24190b9_0_7:notes"/>
+          <p:cNvSpPr txBox="1"/>
+          <p:nvPr>
+            <p:ph idx="1" type="body"/>
+          </p:nvPr>
+        </p:nvSpPr>
+        <p:spPr>
+          <a:xfrm>
+            <a:off x="685800" y="4343400"/>
+            <a:ext cx="5486400" cy="4114800"/>
+          </a:xfrm>
+          <a:prstGeom prst="rect">
+            <a:avLst/>
+          </a:prstGeom>
+        </p:spPr>
+        <p:txBody>
+          <a:bodyPr anchorCtr="0" anchor="t" bIns="91425" lIns="91425" spcFirstLastPara="1" rIns="91425" wrap="square" tIns="91425">
+            <a:noAutofit/>
+          </a:bodyPr>
+          <a:lstStyle/>
+          <a:p>
+            <a:pPr indent="0" lvl="0" marL="0" rtl="0" algn="l">
+              <a:spcBef>
+                <a:spcPts val="0"/>
+              </a:spcBef>
+              <a:spcAft>
+                <a:spcPts val="0"/>
+              </a:spcAft>
+              <a:buNone/>
+            </a:pPr>
+            <a:r>
+              <a:t/>
+            </a:r>
+            <a:endParaRPr/>
+          </a:p>
+        </p:txBody>
+      </p:sp>
+    </p:spTree>
+  </p:cSld>
+  <p:clrMapOvr>
+    <a:masterClrMapping/>
+  </p:clrMapOvr>
+</p:notes>
+</file>
+
+<file path=ppt/notesSlides/notesSlide8.xml><?xml version="1.0" encoding="utf-8"?>
+<p:notes xmlns:a="http://schemas.openxmlformats.org/drawingml/2006/main" xmlns:r="http://schemas.openxmlformats.org/officeDocument/2006/relationships" xmlns:mc="http://schemas.openxmlformats.org/markup-compatibility/2006" xmlns:mv="urn:schemas-microsoft-com:mac:vml" xmlns:p="http://schemas.openxmlformats.org/presentationml/2006/main" xmlns:c="http://schemas.openxmlformats.org/drawingml/2006/chart" xmlns:dgm="http://schemas.openxmlformats.org/drawingml/2006/diagram" xmlns:o="urn:schemas-microsoft-com:office:office" xmlns:v="urn:schemas-microsoft-com:vml" xmlns:pvml="urn:schemas-microsoft-com:office:powerpoint" xmlns:com="http://schemas.openxmlformats.org/drawingml/2006/compatibility" xmlns:p14="http://schemas.microsoft.com/office/powerpoint/2010/main" xmlns:p15="http://schemas.microsoft.com/office/powerpoint/2012/main" xmlns:ahyp="http://schemas.microsoft.com/office/drawing/2018/hyperlinkcolor" showMasterPhAnim="0" showMasterSp="0">
+  <p:cSld>
+    <p:spTree>
+      <p:nvGrpSpPr>
+        <p:cNvPr id="174" name="Shape 174"/>
+        <p:cNvGrpSpPr/>
+        <p:nvPr/>
+      </p:nvGrpSpPr>
+      <p:grpSpPr>
+        <a:xfrm>
+          <a:off x="0" y="0"/>
+          <a:ext cx="0" cy="0"/>
+          <a:chOff x="0" y="0"/>
+          <a:chExt cx="0" cy="0"/>
+        </a:xfrm>
+      </p:grpSpPr>
+      <p:sp>
+        <p:nvSpPr>
+          <p:cNvPr id="175" name="Google Shape;175;g20de72deb0f_0_153:notes"/>
+          <p:cNvSpPr/>
+          <p:nvPr>
+            <p:ph idx="2" type="sldImg"/>
+          </p:nvPr>
+        </p:nvSpPr>
+        <p:spPr>
+          <a:xfrm>
+            <a:off x="381300" y="685800"/>
+            <a:ext cx="6096000" cy="3429000"/>
+          </a:xfrm>
+          <a:custGeom>
+            <a:rect b="b" l="l" r="r" t="t"/>
+            <a:pathLst>
+              <a:path extrusionOk="0" h="120000" w="120000">
+                <a:moveTo>
+                  <a:pt x="0" y="0"/>
+                </a:moveTo>
+                <a:lnTo>
+                  <a:pt x="120000" y="0"/>
+                </a:lnTo>
+                <a:lnTo>
+                  <a:pt x="120000" y="120000"/>
+                </a:lnTo>
+                <a:lnTo>
+                  <a:pt x="0" y="120000"/>
+                </a:lnTo>
+                <a:close/>
+              </a:path>
+            </a:pathLst>
+          </a:custGeom>
+        </p:spPr>
+      </p:sp>
+      <p:sp>
+        <p:nvSpPr>
+          <p:cNvPr id="176" name="Google Shape;176;g20de72deb0f_0_153:notes"/>
+          <p:cNvSpPr txBox="1"/>
+          <p:nvPr>
+            <p:ph idx="1" type="body"/>
+          </p:nvPr>
+        </p:nvSpPr>
+        <p:spPr>
+          <a:xfrm>
+            <a:off x="685800" y="4343400"/>
+            <a:ext cx="5486400" cy="4114800"/>
+          </a:xfrm>
+          <a:prstGeom prst="rect">
+            <a:avLst/>
+          </a:prstGeom>
+        </p:spPr>
+        <p:txBody>
+          <a:bodyPr anchorCtr="0" anchor="t" bIns="91425" lIns="91425" spcFirstLastPara="1" rIns="91425" wrap="square" tIns="91425">
+            <a:noAutofit/>
+          </a:bodyPr>
+          <a:lstStyle/>
+          <a:p>
+            <a:pPr indent="0" lvl="0" marL="0" rtl="0" algn="l">
+              <a:spcBef>
+                <a:spcPts val="0"/>
+              </a:spcBef>
+              <a:spcAft>
+                <a:spcPts val="0"/>
+              </a:spcAft>
+              <a:buNone/>
+            </a:pPr>
+            <a:r>
+              <a:t/>
+            </a:r>
+            <a:endParaRPr/>
+          </a:p>
+        </p:txBody>
+      </p:sp>
+    </p:spTree>
+  </p:cSld>
+  <p:clrMapOvr>
+    <a:masterClrMapping/>
+  </p:clrMapOvr>
+</p:notes>
+</file>
+
+<file path=ppt/notesSlides/notesSlide9.xml><?xml version="1.0" encoding="utf-8"?>
+<p:notes xmlns:a="http://schemas.openxmlformats.org/drawingml/2006/main" xmlns:r="http://schemas.openxmlformats.org/officeDocument/2006/relationships" xmlns:mc="http://schemas.openxmlformats.org/markup-compatibility/2006" xmlns:mv="urn:schemas-microsoft-com:mac:vml" xmlns:p="http://schemas.openxmlformats.org/presentationml/2006/main" xmlns:c="http://schemas.openxmlformats.org/drawingml/2006/chart" xmlns:dgm="http://schemas.openxmlformats.org/drawingml/2006/diagram" xmlns:o="urn:schemas-microsoft-com:office:office" xmlns:v="urn:schemas-microsoft-com:vml" xmlns:pvml="urn:schemas-microsoft-com:office:powerpoint" xmlns:com="http://schemas.openxmlformats.org/drawingml/2006/compatibility" xmlns:p14="http://schemas.microsoft.com/office/powerpoint/2010/main" xmlns:p15="http://schemas.microsoft.com/office/powerpoint/2012/main" xmlns:ahyp="http://schemas.microsoft.com/office/drawing/2018/hyperlinkcolor" showMasterPhAnim="0" showMasterSp="0">
+  <p:cSld>
+    <p:spTree>
+      <p:nvGrpSpPr>
+        <p:cNvPr id="185" name="Shape 185"/>
+        <p:cNvGrpSpPr/>
+        <p:nvPr/>
+      </p:nvGrpSpPr>
+      <p:grpSpPr>
+        <a:xfrm>
+          <a:off x="0" y="0"/>
+          <a:ext cx="0" cy="0"/>
+          <a:chOff x="0" y="0"/>
+          <a:chExt cx="0" cy="0"/>
+        </a:xfrm>
+      </p:grpSpPr>
+      <p:sp>
+        <p:nvSpPr>
+          <p:cNvPr id="186" name="Google Shape;186;g2e1b24190b9_0_14:notes"/>
+          <p:cNvSpPr/>
+          <p:nvPr>
+            <p:ph idx="2" type="sldImg"/>
+          </p:nvPr>
+        </p:nvSpPr>
+        <p:spPr>
+          <a:xfrm>
+            <a:off x="381300" y="685800"/>
+            <a:ext cx="6096000" cy="3429000"/>
+          </a:xfrm>
+          <a:custGeom>
+            <a:rect b="b" l="l" r="r" t="t"/>
+            <a:pathLst>
+              <a:path extrusionOk="0" h="120000" w="120000">
+                <a:moveTo>
+                  <a:pt x="0" y="0"/>
+                </a:moveTo>
+                <a:lnTo>
+                  <a:pt x="120000" y="0"/>
+                </a:lnTo>
+                <a:lnTo>
+                  <a:pt x="120000" y="120000"/>
+                </a:lnTo>
+                <a:lnTo>
+                  <a:pt x="0" y="120000"/>
+                </a:lnTo>
+                <a:close/>
+              </a:path>
+            </a:pathLst>
+          </a:custGeom>
+        </p:spPr>
+      </p:sp>
+      <p:sp>
+        <p:nvSpPr>
+          <p:cNvPr id="187" name="Google Shape;187;g2e1b24190b9_0_14:notes"/>
           <p:cNvSpPr txBox="1"/>
           <p:nvPr>
             <p:ph idx="1" type="body"/>
@@ -9737,6 +10037,282 @@
 </p:sld>
 </file>
 
+<file path=ppt/slides/slide10.xml><?xml version="1.0" encoding="utf-8"?>
+<p:sld xmlns:a="http://schemas.openxmlformats.org/drawingml/2006/main" xmlns:r="http://schemas.openxmlformats.org/officeDocument/2006/relationships" xmlns:mc="http://schemas.openxmlformats.org/markup-compatibility/2006" xmlns:mv="urn:schemas-microsoft-com:mac:vml" xmlns:p="http://schemas.openxmlformats.org/presentationml/2006/main" xmlns:c="http://schemas.openxmlformats.org/drawingml/2006/chart" xmlns:dgm="http://schemas.openxmlformats.org/drawingml/2006/diagram" xmlns:o="urn:schemas-microsoft-com:office:office" xmlns:v="urn:schemas-microsoft-com:vml" xmlns:pvml="urn:schemas-microsoft-com:office:powerpoint" xmlns:com="http://schemas.openxmlformats.org/drawingml/2006/compatibility" xmlns:p14="http://schemas.microsoft.com/office/powerpoint/2010/main" xmlns:p15="http://schemas.microsoft.com/office/powerpoint/2012/main" xmlns:ahyp="http://schemas.microsoft.com/office/drawing/2018/hyperlinkcolor">
+  <p:cSld>
+    <p:spTree>
+      <p:nvGrpSpPr>
+        <p:cNvPr id="195" name="Shape 195"/>
+        <p:cNvGrpSpPr/>
+        <p:nvPr/>
+      </p:nvGrpSpPr>
+      <p:grpSpPr>
+        <a:xfrm>
+          <a:off x="0" y="0"/>
+          <a:ext cx="0" cy="0"/>
+          <a:chOff x="0" y="0"/>
+          <a:chExt cx="0" cy="0"/>
+        </a:xfrm>
+      </p:grpSpPr>
+      <p:sp>
+        <p:nvSpPr>
+          <p:cNvPr id="196" name="Google Shape;196;p22"/>
+          <p:cNvSpPr txBox="1"/>
+          <p:nvPr/>
+        </p:nvSpPr>
+        <p:spPr>
+          <a:xfrm>
+            <a:off x="1879800" y="1802100"/>
+            <a:ext cx="5384400" cy="1970100"/>
+          </a:xfrm>
+          <a:prstGeom prst="rect">
+            <a:avLst/>
+          </a:prstGeom>
+          <a:noFill/>
+          <a:ln>
+            <a:noFill/>
+          </a:ln>
+        </p:spPr>
+        <p:txBody>
+          <a:bodyPr anchorCtr="0" anchor="t" bIns="91425" lIns="91425" spcFirstLastPara="1" rIns="91425" wrap="square" tIns="91425">
+            <a:spAutoFit/>
+          </a:bodyPr>
+          <a:lstStyle/>
+          <a:p>
+            <a:pPr indent="0" lvl="0" marL="0" rtl="0" algn="l">
+              <a:spcBef>
+                <a:spcPts val="0"/>
+              </a:spcBef>
+              <a:spcAft>
+                <a:spcPts val="0"/>
+              </a:spcAft>
+              <a:buNone/>
+            </a:pPr>
+            <a:r>
+              <a:rPr lang="en">
+                <a:solidFill>
+                  <a:schemeClr val="lt1"/>
+                </a:solidFill>
+              </a:rPr>
+              <a:t>Fonte:</a:t>
+            </a:r>
+            <a:endParaRPr>
+              <a:solidFill>
+                <a:schemeClr val="lt1"/>
+              </a:solidFill>
+            </a:endParaRPr>
+          </a:p>
+          <a:p>
+            <a:pPr indent="0" lvl="0" marL="0" rtl="0" algn="l">
+              <a:spcBef>
+                <a:spcPts val="0"/>
+              </a:spcBef>
+              <a:spcAft>
+                <a:spcPts val="0"/>
+              </a:spcAft>
+              <a:buNone/>
+            </a:pPr>
+            <a:r>
+              <a:t/>
+            </a:r>
+            <a:endParaRPr/>
+          </a:p>
+          <a:p>
+            <a:pPr indent="0" lvl="0" marL="0" rtl="0" algn="l">
+              <a:spcBef>
+                <a:spcPts val="0"/>
+              </a:spcBef>
+              <a:spcAft>
+                <a:spcPts val="0"/>
+              </a:spcAft>
+              <a:buNone/>
+            </a:pPr>
+            <a:r>
+              <a:rPr lang="en" sz="1500" u="sng">
+                <a:solidFill>
+                  <a:schemeClr val="lt1"/>
+                </a:solidFill>
+                <a:latin typeface="Lato"/>
+                <a:ea typeface="Lato"/>
+                <a:cs typeface="Lato"/>
+                <a:sym typeface="Lato"/>
+                <a:hlinkClick r:id="rId3">
+                  <a:extLst>
+                    <a:ext uri="{A12FA001-AC4F-418D-AE19-62706E023703}">
+                      <ahyp:hlinkClr val="tx"/>
+                    </a:ext>
+                  </a:extLst>
+                </a:hlinkClick>
+              </a:rPr>
+              <a:t>https://refactoring.guru/pt-br/design-patterns/flyweight</a:t>
+            </a:r>
+            <a:endParaRPr sz="1500">
+              <a:solidFill>
+                <a:schemeClr val="lt1"/>
+              </a:solidFill>
+              <a:latin typeface="Lato"/>
+              <a:ea typeface="Lato"/>
+              <a:cs typeface="Lato"/>
+              <a:sym typeface="Lato"/>
+            </a:endParaRPr>
+          </a:p>
+          <a:p>
+            <a:pPr indent="0" lvl="0" marL="0" rtl="0" algn="l">
+              <a:spcBef>
+                <a:spcPts val="0"/>
+              </a:spcBef>
+              <a:spcAft>
+                <a:spcPts val="0"/>
+              </a:spcAft>
+              <a:buNone/>
+            </a:pPr>
+            <a:r>
+              <a:t/>
+            </a:r>
+            <a:endParaRPr sz="1500">
+              <a:solidFill>
+                <a:schemeClr val="lt1"/>
+              </a:solidFill>
+              <a:latin typeface="Lato"/>
+              <a:ea typeface="Lato"/>
+              <a:cs typeface="Lato"/>
+              <a:sym typeface="Lato"/>
+            </a:endParaRPr>
+          </a:p>
+          <a:p>
+            <a:pPr indent="0" lvl="0" marL="0" rtl="0" algn="l">
+              <a:spcBef>
+                <a:spcPts val="0"/>
+              </a:spcBef>
+              <a:spcAft>
+                <a:spcPts val="0"/>
+              </a:spcAft>
+              <a:buNone/>
+            </a:pPr>
+            <a:r>
+              <a:rPr lang="en" sz="1500" u="sng">
+                <a:solidFill>
+                  <a:schemeClr val="lt1"/>
+                </a:solidFill>
+                <a:latin typeface="Lato"/>
+                <a:ea typeface="Lato"/>
+                <a:cs typeface="Lato"/>
+                <a:sym typeface="Lato"/>
+                <a:hlinkClick r:id="rId4">
+                  <a:extLst>
+                    <a:ext uri="{A12FA001-AC4F-418D-AE19-62706E023703}">
+                      <ahyp:hlinkClr val="tx"/>
+                    </a:ext>
+                  </a:extLst>
+                </a:hlinkClick>
+              </a:rPr>
+              <a:t>https://dev.to/higordiego/padrao-flyweight-2n69</a:t>
+            </a:r>
+            <a:endParaRPr sz="1500">
+              <a:solidFill>
+                <a:schemeClr val="lt1"/>
+              </a:solidFill>
+              <a:latin typeface="Lato"/>
+              <a:ea typeface="Lato"/>
+              <a:cs typeface="Lato"/>
+              <a:sym typeface="Lato"/>
+            </a:endParaRPr>
+          </a:p>
+          <a:p>
+            <a:pPr indent="0" lvl="0" marL="0" rtl="0" algn="l">
+              <a:spcBef>
+                <a:spcPts val="0"/>
+              </a:spcBef>
+              <a:spcAft>
+                <a:spcPts val="0"/>
+              </a:spcAft>
+              <a:buNone/>
+            </a:pPr>
+            <a:r>
+              <a:t/>
+            </a:r>
+            <a:endParaRPr sz="1500">
+              <a:solidFill>
+                <a:schemeClr val="lt1"/>
+              </a:solidFill>
+              <a:latin typeface="Lato"/>
+              <a:ea typeface="Lato"/>
+              <a:cs typeface="Lato"/>
+              <a:sym typeface="Lato"/>
+            </a:endParaRPr>
+          </a:p>
+          <a:p>
+            <a:pPr indent="0" lvl="0" marL="0" rtl="0" algn="l">
+              <a:spcBef>
+                <a:spcPts val="0"/>
+              </a:spcBef>
+              <a:spcAft>
+                <a:spcPts val="0"/>
+              </a:spcAft>
+              <a:buNone/>
+            </a:pPr>
+            <a:r>
+              <a:rPr lang="en" sz="1500" u="sng">
+                <a:solidFill>
+                  <a:schemeClr val="lt1"/>
+                </a:solidFill>
+                <a:latin typeface="Lato"/>
+                <a:ea typeface="Lato"/>
+                <a:cs typeface="Lato"/>
+                <a:sym typeface="Lato"/>
+                <a:hlinkClick r:id="rId5">
+                  <a:extLst>
+                    <a:ext uri="{A12FA001-AC4F-418D-AE19-62706E023703}">
+                      <ahyp:hlinkClr val="tx"/>
+                    </a:ext>
+                  </a:extLst>
+                </a:hlinkClick>
+              </a:rPr>
+              <a:t>https://macoratti.net/21/09/c_flyweight1.htm</a:t>
+            </a:r>
+            <a:endParaRPr sz="1500">
+              <a:solidFill>
+                <a:schemeClr val="lt1"/>
+              </a:solidFill>
+              <a:latin typeface="Lato"/>
+              <a:ea typeface="Lato"/>
+              <a:cs typeface="Lato"/>
+              <a:sym typeface="Lato"/>
+            </a:endParaRPr>
+          </a:p>
+          <a:p>
+            <a:pPr indent="0" lvl="0" marL="0" rtl="0" algn="l">
+              <a:spcBef>
+                <a:spcPts val="0"/>
+              </a:spcBef>
+              <a:spcAft>
+                <a:spcPts val="0"/>
+              </a:spcAft>
+              <a:buNone/>
+            </a:pPr>
+            <a:r>
+              <a:t/>
+            </a:r>
+            <a:endParaRPr sz="1300">
+              <a:solidFill>
+                <a:schemeClr val="lt1"/>
+              </a:solidFill>
+              <a:latin typeface="Lato"/>
+              <a:ea typeface="Lato"/>
+              <a:cs typeface="Lato"/>
+              <a:sym typeface="Lato"/>
+            </a:endParaRPr>
+          </a:p>
+        </p:txBody>
+      </p:sp>
+    </p:spTree>
+  </p:cSld>
+  <p:clrMapOvr>
+    <a:masterClrMapping/>
+  </p:clrMapOvr>
+</p:sld>
+</file>
+
 <file path=ppt/slides/slide2.xml><?xml version="1.0" encoding="utf-8"?>
 <p:sld xmlns:a="http://schemas.openxmlformats.org/drawingml/2006/main" xmlns:r="http://schemas.openxmlformats.org/officeDocument/2006/relationships" xmlns:mc="http://schemas.openxmlformats.org/markup-compatibility/2006" xmlns:mv="urn:schemas-microsoft-com:mac:vml" xmlns:p="http://schemas.openxmlformats.org/presentationml/2006/main" xmlns:c="http://schemas.openxmlformats.org/drawingml/2006/chart" xmlns:dgm="http://schemas.openxmlformats.org/drawingml/2006/diagram" xmlns:o="urn:schemas-microsoft-com:office:office" xmlns:v="urn:schemas-microsoft-com:vml" xmlns:pvml="urn:schemas-microsoft-com:office:powerpoint" xmlns:com="http://schemas.openxmlformats.org/drawingml/2006/compatibility" xmlns:p14="http://schemas.microsoft.com/office/powerpoint/2010/main" xmlns:p15="http://schemas.microsoft.com/office/powerpoint/2012/main" xmlns:ahyp="http://schemas.microsoft.com/office/drawing/2018/hyperlinkcolor">
   <p:cSld>
@@ -9804,7 +10380,7 @@
         </p:nvSpPr>
         <p:spPr>
           <a:xfrm>
-            <a:off x="1297500" y="1567550"/>
+            <a:off x="1052550" y="1497600"/>
             <a:ext cx="7038900" cy="2911200"/>
           </a:xfrm>
           <a:prstGeom prst="rect">
@@ -9813,21 +10389,25 @@
         </p:spPr>
         <p:txBody>
           <a:bodyPr anchorCtr="0" anchor="t" bIns="91425" lIns="91425" spcFirstLastPara="1" rIns="91425" wrap="square" tIns="91425">
-            <a:normAutofit/>
+            <a:noAutofit/>
           </a:bodyPr>
           <a:lstStyle/>
           <a:p>
             <a:pPr indent="0" lvl="0" marL="0" rtl="0" algn="just">
-              <a:spcBef>
-                <a:spcPts val="0"/>
-              </a:spcBef>
-              <a:spcAft>
-                <a:spcPts val="0"/>
-              </a:spcAft>
+              <a:lnSpc>
+                <a:spcPct val="95000"/>
+              </a:lnSpc>
+              <a:spcBef>
+                <a:spcPts val="0"/>
+              </a:spcBef>
+              <a:spcAft>
+                <a:spcPts val="0"/>
+              </a:spcAft>
+              <a:buSzPts val="688"/>
               <a:buNone/>
             </a:pPr>
             <a:r>
-              <a:rPr lang="en" sz="2000">
+              <a:rPr lang="en" sz="1500">
                 <a:solidFill>
                   <a:srgbClr val="444444"/>
                 </a:solidFill>
@@ -9839,40 +10419,25 @@
                 <a:cs typeface="Arial"/>
                 <a:sym typeface="Arial"/>
               </a:rPr>
-              <a:t>O Flyweight é um padrão de projeto estrutural que permite colocar mais objetos na quantidade de RAM disponível ao compartilhar</a:t>
+              <a:t>O padrão Flyweight é um padrão de design de software que permite </a:t>
             </a:r>
             <a:r>
-              <a:rPr lang="en" sz="2000">
+              <a:rPr lang="en" sz="1500">
                 <a:solidFill>
-                  <a:schemeClr val="dk1"/>
+                  <a:srgbClr val="444444"/>
                 </a:solidFill>
                 <a:highlight>
-                  <a:srgbClr val="FF9900"/>
+                  <a:srgbClr val="F9CB9C"/>
                 </a:highlight>
                 <a:latin typeface="Arial"/>
                 <a:ea typeface="Arial"/>
                 <a:cs typeface="Arial"/>
                 <a:sym typeface="Arial"/>
               </a:rPr>
-              <a:t> </a:t>
+              <a:t>compartilhar objetos idênticos</a:t>
             </a:r>
             <a:r>
-              <a:rPr lang="en" sz="2000">
-                <a:solidFill>
-                  <a:srgbClr val="444444"/>
-                </a:solidFill>
-                <a:highlight>
-                  <a:srgbClr val="FF9900"/>
-                </a:highlight>
-                <a:latin typeface="Arial"/>
-                <a:ea typeface="Arial"/>
-                <a:cs typeface="Arial"/>
-                <a:sym typeface="Arial"/>
-              </a:rPr>
-              <a:t>partes comuns </a:t>
-            </a:r>
-            <a:r>
-              <a:rPr lang="en" sz="2000">
+              <a:rPr lang="en" sz="1500">
                 <a:solidFill>
                   <a:srgbClr val="444444"/>
                 </a:solidFill>
@@ -9884,9 +10449,9 @@
                 <a:cs typeface="Arial"/>
                 <a:sym typeface="Arial"/>
               </a:rPr>
-              <a:t>de estado entre os múltiplos objetos ao invés de manter todos os dados em cada objeto.</a:t>
+              <a:t> em vez de criar uma instância independente para cada uso. </a:t>
             </a:r>
-            <a:endParaRPr sz="2000">
+            <a:endParaRPr sz="1500">
               <a:solidFill>
                 <a:srgbClr val="444444"/>
               </a:solidFill>
@@ -9901,18 +10466,298 @@
           </a:p>
           <a:p>
             <a:pPr indent="0" lvl="0" marL="0" rtl="0" algn="just">
+              <a:lnSpc>
+                <a:spcPct val="95000"/>
+              </a:lnSpc>
               <a:spcBef>
                 <a:spcPts val="1800"/>
               </a:spcBef>
               <a:spcAft>
                 <a:spcPts val="0"/>
               </a:spcAft>
+              <a:buSzPts val="688"/>
+              <a:buNone/>
+            </a:pPr>
+            <a:r>
+              <a:rPr lang="en" sz="1500">
+                <a:solidFill>
+                  <a:srgbClr val="444444"/>
+                </a:solidFill>
+                <a:highlight>
+                  <a:srgbClr val="FFFFFF"/>
+                </a:highlight>
+                <a:latin typeface="Arial"/>
+                <a:ea typeface="Arial"/>
+                <a:cs typeface="Arial"/>
+                <a:sym typeface="Arial"/>
+              </a:rPr>
+              <a:t>Isso é feito para </a:t>
+            </a:r>
+            <a:r>
+              <a:rPr lang="en" sz="1500">
+                <a:solidFill>
+                  <a:srgbClr val="444444"/>
+                </a:solidFill>
+                <a:highlight>
+                  <a:srgbClr val="F9CB9C"/>
+                </a:highlight>
+                <a:latin typeface="Arial"/>
+                <a:ea typeface="Arial"/>
+                <a:cs typeface="Arial"/>
+                <a:sym typeface="Arial"/>
+              </a:rPr>
+              <a:t>reduzir o uso de memória e melhorar o desempenho</a:t>
+            </a:r>
+            <a:r>
+              <a:rPr lang="en" sz="1500">
+                <a:solidFill>
+                  <a:srgbClr val="444444"/>
+                </a:solidFill>
+                <a:highlight>
+                  <a:srgbClr val="FFFFFF"/>
+                </a:highlight>
+                <a:latin typeface="Arial"/>
+                <a:ea typeface="Arial"/>
+                <a:cs typeface="Arial"/>
+                <a:sym typeface="Arial"/>
+              </a:rPr>
+              <a:t>, especialmente em aplicações grandes ou com muitos objetos semelhantes. </a:t>
+            </a:r>
+            <a:endParaRPr sz="1500">
+              <a:solidFill>
+                <a:srgbClr val="444444"/>
+              </a:solidFill>
+              <a:highlight>
+                <a:srgbClr val="FFFFFF"/>
+              </a:highlight>
+              <a:latin typeface="Arial"/>
+              <a:ea typeface="Arial"/>
+              <a:cs typeface="Arial"/>
+              <a:sym typeface="Arial"/>
+            </a:endParaRPr>
+          </a:p>
+          <a:p>
+            <a:pPr indent="0" lvl="0" marL="0" rtl="0" algn="just">
+              <a:lnSpc>
+                <a:spcPct val="95000"/>
+              </a:lnSpc>
+              <a:spcBef>
+                <a:spcPts val="1800"/>
+              </a:spcBef>
+              <a:spcAft>
+                <a:spcPts val="0"/>
+              </a:spcAft>
+              <a:buSzPts val="688"/>
+              <a:buNone/>
+            </a:pPr>
+            <a:r>
+              <a:rPr lang="en" sz="1500">
+                <a:solidFill>
+                  <a:srgbClr val="444444"/>
+                </a:solidFill>
+                <a:highlight>
+                  <a:srgbClr val="FFFFFF"/>
+                </a:highlight>
+                <a:latin typeface="Arial"/>
+                <a:ea typeface="Arial"/>
+                <a:cs typeface="Arial"/>
+                <a:sym typeface="Arial"/>
+              </a:rPr>
+              <a:t>O padrão </a:t>
+            </a:r>
+            <a:r>
+              <a:rPr lang="en" sz="1500">
+                <a:solidFill>
+                  <a:srgbClr val="444444"/>
+                </a:solidFill>
+                <a:highlight>
+                  <a:srgbClr val="F9CB9C"/>
+                </a:highlight>
+                <a:latin typeface="Arial"/>
+                <a:ea typeface="Arial"/>
+                <a:cs typeface="Arial"/>
+                <a:sym typeface="Arial"/>
+              </a:rPr>
+              <a:t>separa o estado compartilhado</a:t>
+            </a:r>
+            <a:r>
+              <a:rPr lang="en" sz="1500">
+                <a:solidFill>
+                  <a:srgbClr val="444444"/>
+                </a:solidFill>
+                <a:highlight>
+                  <a:srgbClr val="FFFFFF"/>
+                </a:highlight>
+                <a:latin typeface="Arial"/>
+                <a:ea typeface="Arial"/>
+                <a:cs typeface="Arial"/>
+                <a:sym typeface="Arial"/>
+              </a:rPr>
+              <a:t>, que é armazenado no objeto </a:t>
+            </a:r>
+            <a:r>
+              <a:rPr b="1" lang="en" sz="1500">
+                <a:solidFill>
+                  <a:srgbClr val="444444"/>
+                </a:solidFill>
+                <a:highlight>
+                  <a:srgbClr val="FFD966"/>
+                </a:highlight>
+                <a:latin typeface="Arial"/>
+                <a:ea typeface="Arial"/>
+                <a:cs typeface="Arial"/>
+                <a:sym typeface="Arial"/>
+              </a:rPr>
+              <a:t>Flyweight</a:t>
+            </a:r>
+            <a:r>
+              <a:rPr lang="en" sz="1500">
+                <a:solidFill>
+                  <a:srgbClr val="444444"/>
+                </a:solidFill>
+                <a:highlight>
+                  <a:srgbClr val="FFFFFF"/>
+                </a:highlight>
+                <a:latin typeface="Arial"/>
+                <a:ea typeface="Arial"/>
+                <a:cs typeface="Arial"/>
+                <a:sym typeface="Arial"/>
+              </a:rPr>
+              <a:t>, do </a:t>
+            </a:r>
+            <a:r>
+              <a:rPr lang="en" sz="1500">
+                <a:solidFill>
+                  <a:srgbClr val="444444"/>
+                </a:solidFill>
+                <a:highlight>
+                  <a:srgbClr val="F9CB9C"/>
+                </a:highlight>
+                <a:latin typeface="Arial"/>
+                <a:ea typeface="Arial"/>
+                <a:cs typeface="Arial"/>
+                <a:sym typeface="Arial"/>
+              </a:rPr>
+              <a:t>estado não compartilhado</a:t>
+            </a:r>
+            <a:r>
+              <a:rPr lang="en" sz="1500">
+                <a:solidFill>
+                  <a:srgbClr val="444444"/>
+                </a:solidFill>
+                <a:highlight>
+                  <a:srgbClr val="FFFFFF"/>
+                </a:highlight>
+                <a:latin typeface="Arial"/>
+                <a:ea typeface="Arial"/>
+                <a:cs typeface="Arial"/>
+                <a:sym typeface="Arial"/>
+              </a:rPr>
+              <a:t>, que é mantido pelo </a:t>
+            </a:r>
+            <a:r>
+              <a:rPr b="1" lang="en" sz="1500">
+                <a:solidFill>
+                  <a:srgbClr val="444444"/>
+                </a:solidFill>
+                <a:highlight>
+                  <a:srgbClr val="FFD966"/>
+                </a:highlight>
+                <a:latin typeface="Arial"/>
+                <a:ea typeface="Arial"/>
+                <a:cs typeface="Arial"/>
+                <a:sym typeface="Arial"/>
+              </a:rPr>
+              <a:t>cliente</a:t>
+            </a:r>
+            <a:r>
+              <a:rPr lang="en" sz="1500">
+                <a:solidFill>
+                  <a:srgbClr val="444444"/>
+                </a:solidFill>
+                <a:highlight>
+                  <a:srgbClr val="FFFFFF"/>
+                </a:highlight>
+                <a:latin typeface="Arial"/>
+                <a:ea typeface="Arial"/>
+                <a:cs typeface="Arial"/>
+                <a:sym typeface="Arial"/>
+              </a:rPr>
+              <a:t>. </a:t>
+            </a:r>
+            <a:endParaRPr sz="1500">
+              <a:solidFill>
+                <a:srgbClr val="444444"/>
+              </a:solidFill>
+              <a:highlight>
+                <a:srgbClr val="FFFFFF"/>
+              </a:highlight>
+              <a:latin typeface="Arial"/>
+              <a:ea typeface="Arial"/>
+              <a:cs typeface="Arial"/>
+              <a:sym typeface="Arial"/>
+            </a:endParaRPr>
+          </a:p>
+          <a:p>
+            <a:pPr indent="0" lvl="0" marL="0" rtl="0" algn="just">
+              <a:lnSpc>
+                <a:spcPct val="95000"/>
+              </a:lnSpc>
+              <a:spcBef>
+                <a:spcPts val="1800"/>
+              </a:spcBef>
+              <a:spcAft>
+                <a:spcPts val="0"/>
+              </a:spcAft>
+              <a:buSzPts val="688"/>
+              <a:buNone/>
+            </a:pPr>
+            <a:r>
+              <a:rPr lang="en" sz="1500">
+                <a:solidFill>
+                  <a:srgbClr val="444444"/>
+                </a:solidFill>
+                <a:highlight>
+                  <a:srgbClr val="FFFFFF"/>
+                </a:highlight>
+                <a:latin typeface="Arial"/>
+                <a:ea typeface="Arial"/>
+                <a:cs typeface="Arial"/>
+                <a:sym typeface="Arial"/>
+              </a:rPr>
+              <a:t>O padrão Flyweight é útil para otimizar aplicações que possuem muitos objetos idênticos com pequenas variações.</a:t>
+            </a:r>
+            <a:endParaRPr sz="1500">
+              <a:solidFill>
+                <a:srgbClr val="444444"/>
+              </a:solidFill>
+              <a:highlight>
+                <a:srgbClr val="FFFFFF"/>
+              </a:highlight>
+              <a:latin typeface="Arial"/>
+              <a:ea typeface="Arial"/>
+              <a:cs typeface="Arial"/>
+              <a:sym typeface="Arial"/>
+            </a:endParaRPr>
+          </a:p>
+          <a:p>
+            <a:pPr indent="0" lvl="0" marL="0" rtl="0" algn="just">
+              <a:lnSpc>
+                <a:spcPct val="95000"/>
+              </a:lnSpc>
+              <a:spcBef>
+                <a:spcPts val="1800"/>
+              </a:spcBef>
+              <a:spcAft>
+                <a:spcPts val="0"/>
+              </a:spcAft>
+              <a:buSzPts val="688"/>
               <a:buNone/>
             </a:pPr>
             <a:r>
               <a:t/>
             </a:r>
-            <a:endParaRPr sz="1100">
+            <a:endParaRPr sz="1500">
               <a:solidFill>
                 <a:srgbClr val="000000"/>
               </a:solidFill>
@@ -9924,18 +10769,22 @@
           </a:p>
           <a:p>
             <a:pPr indent="0" lvl="0" marL="0" rtl="0" algn="just">
+              <a:lnSpc>
+                <a:spcPct val="95000"/>
+              </a:lnSpc>
               <a:spcBef>
                 <a:spcPts val="0"/>
               </a:spcBef>
               <a:spcAft>
                 <a:spcPts val="1200"/>
               </a:spcAft>
+              <a:buSzPts val="688"/>
               <a:buNone/>
             </a:pPr>
             <a:r>
               <a:t/>
             </a:r>
-            <a:endParaRPr/>
+            <a:endParaRPr sz="912"/>
           </a:p>
         </p:txBody>
       </p:sp>
@@ -10490,37 +11339,9 @@
           </a:p>
         </p:txBody>
       </p:sp>
-      <p:pic>
-        <p:nvPicPr>
-          <p:cNvPr id="159" name="Google Shape;159;p17"/>
-          <p:cNvPicPr preferRelativeResize="0"/>
-          <p:nvPr/>
-        </p:nvPicPr>
-        <p:blipFill>
-          <a:blip r:embed="rId3">
-            <a:alphaModFix/>
-          </a:blip>
-          <a:stretch>
-            <a:fillRect/>
-          </a:stretch>
-        </p:blipFill>
-        <p:spPr>
-          <a:xfrm>
-            <a:off x="1922552" y="1554375"/>
-            <a:ext cx="5788800" cy="2803950"/>
-          </a:xfrm>
-          <a:prstGeom prst="rect">
-            <a:avLst/>
-          </a:prstGeom>
-          <a:noFill/>
-          <a:ln>
-            <a:noFill/>
-          </a:ln>
-        </p:spPr>
-      </p:pic>
       <p:sp>
         <p:nvSpPr>
-          <p:cNvPr id="160" name="Google Shape;160;p17"/>
+          <p:cNvPr id="159" name="Google Shape;159;p17"/>
           <p:cNvSpPr txBox="1"/>
           <p:nvPr>
             <p:ph type="title"/>
@@ -10558,6 +11379,34 @@
           </a:p>
         </p:txBody>
       </p:sp>
+      <p:pic>
+        <p:nvPicPr>
+          <p:cNvPr id="160" name="Google Shape;160;p17"/>
+          <p:cNvPicPr preferRelativeResize="0"/>
+          <p:nvPr/>
+        </p:nvPicPr>
+        <p:blipFill>
+          <a:blip r:embed="rId3">
+            <a:alphaModFix/>
+          </a:blip>
+          <a:stretch>
+            <a:fillRect/>
+          </a:stretch>
+        </p:blipFill>
+        <p:spPr>
+          <a:xfrm>
+            <a:off x="1428750" y="1491750"/>
+            <a:ext cx="6286500" cy="2476500"/>
+          </a:xfrm>
+          <a:prstGeom prst="rect">
+            <a:avLst/>
+          </a:prstGeom>
+          <a:noFill/>
+          <a:ln>
+            <a:noFill/>
+          </a:ln>
+        </p:spPr>
+      </p:pic>
     </p:spTree>
   </p:cSld>
   <p:clrMapOvr>
@@ -10586,6 +11435,99 @@
       <p:sp>
         <p:nvSpPr>
           <p:cNvPr id="165" name="Google Shape;165;p18"/>
+          <p:cNvSpPr/>
+          <p:nvPr/>
+        </p:nvSpPr>
+        <p:spPr>
+          <a:xfrm>
+            <a:off x="1526388" y="1491750"/>
+            <a:ext cx="6581100" cy="2929200"/>
+          </a:xfrm>
+          <a:prstGeom prst="rect">
+            <a:avLst/>
+          </a:prstGeom>
+          <a:solidFill>
+            <a:schemeClr val="dk2"/>
+          </a:solidFill>
+          <a:ln cap="flat" cmpd="sng" w="9525">
+            <a:solidFill>
+              <a:schemeClr val="dk2"/>
+            </a:solidFill>
+            <a:prstDash val="solid"/>
+            <a:round/>
+            <a:headEnd len="sm" w="sm" type="none"/>
+            <a:tailEnd len="sm" w="sm" type="none"/>
+          </a:ln>
+          <a:effectLst>
+            <a:outerShdw blurRad="57150" rotWithShape="0" algn="bl" dir="5400000" dist="19050">
+              <a:srgbClr val="000000">
+                <a:alpha val="50000"/>
+              </a:srgbClr>
+            </a:outerShdw>
+            <a:reflection blurRad="0" dir="5400000" dist="38100" endA="0" endPos="30000" fadeDir="5400012" kx="0" rotWithShape="0" algn="bl" stPos="0" sy="-100000" ky="0"/>
+          </a:effectLst>
+        </p:spPr>
+        <p:txBody>
+          <a:bodyPr anchorCtr="0" anchor="ctr" bIns="91425" lIns="91425" spcFirstLastPara="1" rIns="91425" wrap="square" tIns="91425">
+            <a:noAutofit/>
+          </a:bodyPr>
+          <a:lstStyle/>
+          <a:p>
+            <a:pPr indent="0" lvl="0" marL="0" rtl="0" algn="ctr">
+              <a:spcBef>
+                <a:spcPts val="0"/>
+              </a:spcBef>
+              <a:spcAft>
+                <a:spcPts val="0"/>
+              </a:spcAft>
+              <a:buNone/>
+            </a:pPr>
+            <a:r>
+              <a:t/>
+            </a:r>
+            <a:endParaRPr>
+              <a:highlight>
+                <a:schemeClr val="dk2"/>
+              </a:highlight>
+              <a:latin typeface="Lato"/>
+              <a:ea typeface="Lato"/>
+              <a:cs typeface="Lato"/>
+              <a:sym typeface="Lato"/>
+            </a:endParaRPr>
+          </a:p>
+        </p:txBody>
+      </p:sp>
+      <p:pic>
+        <p:nvPicPr>
+          <p:cNvPr id="166" name="Google Shape;166;p18"/>
+          <p:cNvPicPr preferRelativeResize="0"/>
+          <p:nvPr/>
+        </p:nvPicPr>
+        <p:blipFill>
+          <a:blip r:embed="rId3">
+            <a:alphaModFix/>
+          </a:blip>
+          <a:stretch>
+            <a:fillRect/>
+          </a:stretch>
+        </p:blipFill>
+        <p:spPr>
+          <a:xfrm>
+            <a:off x="1922552" y="1554375"/>
+            <a:ext cx="5788800" cy="2803950"/>
+          </a:xfrm>
+          <a:prstGeom prst="rect">
+            <a:avLst/>
+          </a:prstGeom>
+          <a:noFill/>
+          <a:ln>
+            <a:noFill/>
+          </a:ln>
+        </p:spPr>
+      </p:pic>
+      <p:sp>
+        <p:nvSpPr>
+          <p:cNvPr id="167" name="Google Shape;167;p18"/>
           <p:cNvSpPr txBox="1"/>
           <p:nvPr>
             <p:ph type="title"/>
@@ -10616,6 +11558,189 @@
               <a:buNone/>
             </a:pPr>
             <a:r>
+              <a:rPr lang="en" sz="4000"/>
+              <a:t>Aplicabilidade</a:t>
+            </a:r>
+            <a:endParaRPr sz="4000"/>
+          </a:p>
+        </p:txBody>
+      </p:sp>
+    </p:spTree>
+  </p:cSld>
+  <p:clrMapOvr>
+    <a:masterClrMapping/>
+  </p:clrMapOvr>
+</p:sld>
+</file>
+
+<file path=ppt/slides/slide7.xml><?xml version="1.0" encoding="utf-8"?>
+<p:sld xmlns:a="http://schemas.openxmlformats.org/drawingml/2006/main" xmlns:r="http://schemas.openxmlformats.org/officeDocument/2006/relationships" xmlns:mc="http://schemas.openxmlformats.org/markup-compatibility/2006" xmlns:mv="urn:schemas-microsoft-com:mac:vml" xmlns:p="http://schemas.openxmlformats.org/presentationml/2006/main" xmlns:c="http://schemas.openxmlformats.org/drawingml/2006/chart" xmlns:dgm="http://schemas.openxmlformats.org/drawingml/2006/diagram" xmlns:o="urn:schemas-microsoft-com:office:office" xmlns:v="urn:schemas-microsoft-com:vml" xmlns:pvml="urn:schemas-microsoft-com:office:powerpoint" xmlns:com="http://schemas.openxmlformats.org/drawingml/2006/compatibility" xmlns:p14="http://schemas.microsoft.com/office/powerpoint/2010/main" xmlns:p15="http://schemas.microsoft.com/office/powerpoint/2012/main" xmlns:ahyp="http://schemas.microsoft.com/office/drawing/2018/hyperlinkcolor">
+  <p:cSld>
+    <p:spTree>
+      <p:nvGrpSpPr>
+        <p:cNvPr id="171" name="Shape 171"/>
+        <p:cNvGrpSpPr/>
+        <p:nvPr/>
+      </p:nvGrpSpPr>
+      <p:grpSpPr>
+        <a:xfrm>
+          <a:off x="0" y="0"/>
+          <a:ext cx="0" cy="0"/>
+          <a:chOff x="0" y="0"/>
+          <a:chExt cx="0" cy="0"/>
+        </a:xfrm>
+      </p:grpSpPr>
+      <p:sp>
+        <p:nvSpPr>
+          <p:cNvPr id="172" name="Google Shape;172;p19"/>
+          <p:cNvSpPr/>
+          <p:nvPr/>
+        </p:nvSpPr>
+        <p:spPr>
+          <a:xfrm>
+            <a:off x="1526400" y="326325"/>
+            <a:ext cx="6581100" cy="4094700"/>
+          </a:xfrm>
+          <a:prstGeom prst="rect">
+            <a:avLst/>
+          </a:prstGeom>
+          <a:solidFill>
+            <a:schemeClr val="dk2"/>
+          </a:solidFill>
+          <a:ln cap="flat" cmpd="sng" w="9525">
+            <a:solidFill>
+              <a:schemeClr val="dk2"/>
+            </a:solidFill>
+            <a:prstDash val="solid"/>
+            <a:round/>
+            <a:headEnd len="sm" w="sm" type="none"/>
+            <a:tailEnd len="sm" w="sm" type="none"/>
+          </a:ln>
+          <a:effectLst>
+            <a:outerShdw blurRad="57150" rotWithShape="0" algn="bl" dir="5400000" dist="19050">
+              <a:srgbClr val="000000">
+                <a:alpha val="50000"/>
+              </a:srgbClr>
+            </a:outerShdw>
+            <a:reflection blurRad="0" dir="5400000" dist="38100" endA="0" endPos="30000" fadeDir="5400012" kx="0" rotWithShape="0" algn="bl" stPos="0" sy="-100000" ky="0"/>
+          </a:effectLst>
+        </p:spPr>
+        <p:txBody>
+          <a:bodyPr anchorCtr="0" anchor="ctr" bIns="91425" lIns="91425" spcFirstLastPara="1" rIns="91425" wrap="square" tIns="91425">
+            <a:noAutofit/>
+          </a:bodyPr>
+          <a:lstStyle/>
+          <a:p>
+            <a:pPr indent="0" lvl="0" marL="0" rtl="0" algn="ctr">
+              <a:spcBef>
+                <a:spcPts val="0"/>
+              </a:spcBef>
+              <a:spcAft>
+                <a:spcPts val="0"/>
+              </a:spcAft>
+              <a:buNone/>
+            </a:pPr>
+            <a:r>
+              <a:t/>
+            </a:r>
+            <a:endParaRPr>
+              <a:highlight>
+                <a:schemeClr val="dk2"/>
+              </a:highlight>
+              <a:latin typeface="Lato"/>
+              <a:ea typeface="Lato"/>
+              <a:cs typeface="Lato"/>
+              <a:sym typeface="Lato"/>
+            </a:endParaRPr>
+          </a:p>
+        </p:txBody>
+      </p:sp>
+      <p:pic>
+        <p:nvPicPr>
+          <p:cNvPr id="173" name="Google Shape;173;p19"/>
+          <p:cNvPicPr preferRelativeResize="0"/>
+          <p:nvPr/>
+        </p:nvPicPr>
+        <p:blipFill>
+          <a:blip r:embed="rId3">
+            <a:alphaModFix/>
+          </a:blip>
+          <a:stretch>
+            <a:fillRect/>
+          </a:stretch>
+        </p:blipFill>
+        <p:spPr>
+          <a:xfrm>
+            <a:off x="3239174" y="326325"/>
+            <a:ext cx="3155575" cy="4167750"/>
+          </a:xfrm>
+          <a:prstGeom prst="rect">
+            <a:avLst/>
+          </a:prstGeom>
+          <a:noFill/>
+          <a:ln>
+            <a:noFill/>
+          </a:ln>
+        </p:spPr>
+      </p:pic>
+    </p:spTree>
+  </p:cSld>
+  <p:clrMapOvr>
+    <a:masterClrMapping/>
+  </p:clrMapOvr>
+</p:sld>
+</file>
+
+<file path=ppt/slides/slide8.xml><?xml version="1.0" encoding="utf-8"?>
+<p:sld xmlns:a="http://schemas.openxmlformats.org/drawingml/2006/main" xmlns:r="http://schemas.openxmlformats.org/officeDocument/2006/relationships" xmlns:mc="http://schemas.openxmlformats.org/markup-compatibility/2006" xmlns:mv="urn:schemas-microsoft-com:mac:vml" xmlns:p="http://schemas.openxmlformats.org/presentationml/2006/main" xmlns:c="http://schemas.openxmlformats.org/drawingml/2006/chart" xmlns:dgm="http://schemas.openxmlformats.org/drawingml/2006/diagram" xmlns:o="urn:schemas-microsoft-com:office:office" xmlns:v="urn:schemas-microsoft-com:vml" xmlns:pvml="urn:schemas-microsoft-com:office:powerpoint" xmlns:com="http://schemas.openxmlformats.org/drawingml/2006/compatibility" xmlns:p14="http://schemas.microsoft.com/office/powerpoint/2010/main" xmlns:p15="http://schemas.microsoft.com/office/powerpoint/2012/main" xmlns:ahyp="http://schemas.microsoft.com/office/drawing/2018/hyperlinkcolor">
+  <p:cSld>
+    <p:spTree>
+      <p:nvGrpSpPr>
+        <p:cNvPr id="177" name="Shape 177"/>
+        <p:cNvGrpSpPr/>
+        <p:nvPr/>
+      </p:nvGrpSpPr>
+      <p:grpSpPr>
+        <a:xfrm>
+          <a:off x="0" y="0"/>
+          <a:ext cx="0" cy="0"/>
+          <a:chOff x="0" y="0"/>
+          <a:chExt cx="0" cy="0"/>
+        </a:xfrm>
+      </p:grpSpPr>
+      <p:sp>
+        <p:nvSpPr>
+          <p:cNvPr id="178" name="Google Shape;178;p20"/>
+          <p:cNvSpPr txBox="1"/>
+          <p:nvPr>
+            <p:ph type="title"/>
+          </p:nvPr>
+        </p:nvSpPr>
+        <p:spPr>
+          <a:xfrm>
+            <a:off x="1297500" y="393750"/>
+            <a:ext cx="7038900" cy="914100"/>
+          </a:xfrm>
+          <a:prstGeom prst="rect">
+            <a:avLst/>
+          </a:prstGeom>
+        </p:spPr>
+        <p:txBody>
+          <a:bodyPr anchorCtr="0" anchor="t" bIns="91425" lIns="91425" spcFirstLastPara="1" rIns="91425" wrap="square" tIns="91425">
+            <a:normAutofit/>
+          </a:bodyPr>
+          <a:lstStyle/>
+          <a:p>
+            <a:pPr indent="0" lvl="0" marL="0" rtl="0" algn="l">
+              <a:spcBef>
+                <a:spcPts val="0"/>
+              </a:spcBef>
+              <a:spcAft>
+                <a:spcPts val="0"/>
+              </a:spcAft>
+              <a:buNone/>
+            </a:pPr>
+            <a:r>
               <a:rPr lang="en"/>
               <a:t>Usos conhecidos</a:t>
             </a:r>
@@ -10625,7 +11750,7 @@
       </p:sp>
       <p:sp>
         <p:nvSpPr>
-          <p:cNvPr id="166" name="Google Shape;166;p18"/>
+          <p:cNvPr id="179" name="Google Shape;179;p20"/>
           <p:cNvSpPr txBox="1"/>
           <p:nvPr>
             <p:ph idx="1" type="body"/>
@@ -10665,7 +11790,7 @@
       </p:sp>
       <p:sp>
         <p:nvSpPr>
-          <p:cNvPr id="167" name="Google Shape;167;p18"/>
+          <p:cNvPr id="180" name="Google Shape;180;p20"/>
           <p:cNvSpPr/>
           <p:nvPr/>
         </p:nvSpPr>
@@ -10719,7 +11844,7 @@
       </p:sp>
       <p:pic>
         <p:nvPicPr>
-          <p:cNvPr id="168" name="Google Shape;168;p18"/>
+          <p:cNvPr id="181" name="Google Shape;181;p20"/>
           <p:cNvPicPr preferRelativeResize="0"/>
           <p:nvPr/>
         </p:nvPicPr>
@@ -10747,7 +11872,7 @@
       </p:pic>
       <p:sp>
         <p:nvSpPr>
-          <p:cNvPr id="169" name="Google Shape;169;p18"/>
+          <p:cNvPr id="182" name="Google Shape;182;p20"/>
           <p:cNvSpPr/>
           <p:nvPr/>
         </p:nvSpPr>
@@ -10801,7 +11926,7 @@
       </p:sp>
       <p:sp>
         <p:nvSpPr>
-          <p:cNvPr id="170" name="Google Shape;170;p18"/>
+          <p:cNvPr id="183" name="Google Shape;183;p20"/>
           <p:cNvSpPr txBox="1"/>
           <p:nvPr/>
         </p:nvSpPr>
@@ -10914,7 +12039,7 @@
       </p:sp>
       <p:sp>
         <p:nvSpPr>
-          <p:cNvPr id="171" name="Google Shape;171;p18"/>
+          <p:cNvPr id="184" name="Google Shape;184;p20"/>
           <p:cNvSpPr txBox="1"/>
           <p:nvPr/>
         </p:nvSpPr>
@@ -10978,12 +12103,12 @@
 </p:sld>
 </file>
 
-<file path=ppt/slides/slide7.xml><?xml version="1.0" encoding="utf-8"?>
+<file path=ppt/slides/slide9.xml><?xml version="1.0" encoding="utf-8"?>
 <p:sld xmlns:a="http://schemas.openxmlformats.org/drawingml/2006/main" xmlns:r="http://schemas.openxmlformats.org/officeDocument/2006/relationships" xmlns:mc="http://schemas.openxmlformats.org/markup-compatibility/2006" xmlns:mv="urn:schemas-microsoft-com:mac:vml" xmlns:p="http://schemas.openxmlformats.org/presentationml/2006/main" xmlns:c="http://schemas.openxmlformats.org/drawingml/2006/chart" xmlns:dgm="http://schemas.openxmlformats.org/drawingml/2006/diagram" xmlns:o="urn:schemas-microsoft-com:office:office" xmlns:v="urn:schemas-microsoft-com:vml" xmlns:pvml="urn:schemas-microsoft-com:office:powerpoint" xmlns:com="http://schemas.openxmlformats.org/drawingml/2006/compatibility" xmlns:p14="http://schemas.microsoft.com/office/powerpoint/2010/main" xmlns:p15="http://schemas.microsoft.com/office/powerpoint/2012/main" xmlns:ahyp="http://schemas.microsoft.com/office/drawing/2018/hyperlinkcolor">
   <p:cSld>
     <p:spTree>
       <p:nvGrpSpPr>
-        <p:cNvPr id="175" name="Shape 175"/>
+        <p:cNvPr id="188" name="Shape 188"/>
         <p:cNvGrpSpPr/>
         <p:nvPr/>
       </p:nvGrpSpPr>
@@ -10995,43 +12120,15 @@
           <a:chExt cx="0" cy="0"/>
         </a:xfrm>
       </p:grpSpPr>
-      <p:pic>
-        <p:nvPicPr>
-          <p:cNvPr id="176" name="Google Shape;176;p19"/>
-          <p:cNvPicPr preferRelativeResize="0"/>
-          <p:nvPr/>
-        </p:nvPicPr>
-        <p:blipFill>
-          <a:blip r:embed="rId3">
-            <a:alphaModFix/>
-          </a:blip>
-          <a:stretch>
-            <a:fillRect/>
-          </a:stretch>
-        </p:blipFill>
-        <p:spPr>
-          <a:xfrm>
-            <a:off x="2792465" y="337800"/>
-            <a:ext cx="3559075" cy="3706975"/>
-          </a:xfrm>
-          <a:prstGeom prst="rect">
-            <a:avLst/>
-          </a:prstGeom>
-          <a:noFill/>
-          <a:ln>
-            <a:noFill/>
-          </a:ln>
-        </p:spPr>
-      </p:pic>
       <p:sp>
         <p:nvSpPr>
-          <p:cNvPr id="177" name="Google Shape;177;p19"/>
+          <p:cNvPr id="189" name="Google Shape;189;p21"/>
           <p:cNvSpPr txBox="1"/>
           <p:nvPr/>
         </p:nvSpPr>
         <p:spPr>
           <a:xfrm>
-            <a:off x="1844838" y="4234475"/>
+            <a:off x="1844838" y="4436475"/>
             <a:ext cx="5454300" cy="637200"/>
           </a:xfrm>
           <a:prstGeom prst="rect">
@@ -11081,6 +12178,162 @@
           </a:p>
         </p:txBody>
       </p:sp>
+      <p:sp>
+        <p:nvSpPr>
+          <p:cNvPr id="190" name="Google Shape;190;p21"/>
+          <p:cNvSpPr txBox="1"/>
+          <p:nvPr/>
+        </p:nvSpPr>
+        <p:spPr>
+          <a:xfrm>
+            <a:off x="1058400" y="3712100"/>
+            <a:ext cx="7027200" cy="1185300"/>
+          </a:xfrm>
+          <a:prstGeom prst="rect">
+            <a:avLst/>
+          </a:prstGeom>
+          <a:noFill/>
+          <a:ln>
+            <a:noFill/>
+          </a:ln>
+        </p:spPr>
+        <p:txBody>
+          <a:bodyPr anchorCtr="0" anchor="t" bIns="91425" lIns="91425" spcFirstLastPara="1" rIns="91425" wrap="square" tIns="91425">
+            <a:spAutoFit/>
+          </a:bodyPr>
+          <a:lstStyle/>
+          <a:p>
+            <a:pPr indent="0" lvl="0" marL="0" rtl="0" algn="l">
+              <a:spcBef>
+                <a:spcPts val="0"/>
+              </a:spcBef>
+              <a:spcAft>
+                <a:spcPts val="0"/>
+              </a:spcAft>
+              <a:buNone/>
+            </a:pPr>
+            <a:r>
+              <a:rPr lang="en" sz="1300">
+                <a:solidFill>
+                  <a:schemeClr val="lt1"/>
+                </a:solidFill>
+                <a:latin typeface="Lato"/>
+                <a:ea typeface="Lato"/>
+                <a:cs typeface="Lato"/>
+                <a:sym typeface="Lato"/>
+              </a:rPr>
+              <a:t>Criamos o objeto Soldado apenas uma vez e </a:t>
+            </a:r>
+            <a:r>
+              <a:rPr lang="en" sz="1300">
+                <a:solidFill>
+                  <a:schemeClr val="lt1"/>
+                </a:solidFill>
+                <a:latin typeface="Lato"/>
+                <a:ea typeface="Lato"/>
+                <a:cs typeface="Lato"/>
+                <a:sym typeface="Lato"/>
+              </a:rPr>
+              <a:t>utilizamos</a:t>
+            </a:r>
+            <a:r>
+              <a:rPr lang="en" sz="1300">
+                <a:solidFill>
+                  <a:schemeClr val="lt1"/>
+                </a:solidFill>
+                <a:latin typeface="Lato"/>
+                <a:ea typeface="Lato"/>
+                <a:cs typeface="Lato"/>
+                <a:sym typeface="Lato"/>
+              </a:rPr>
+              <a:t> esse objeto várias vezes para criar um objeto com o mesmo sprite (intrínseco) com atributos diferentes (extrínseco), por exemplo Time, Coordenada X, Coordenada Y, se está Atacando ou não…</a:t>
+            </a:r>
+            <a:endParaRPr sz="1300">
+              <a:solidFill>
+                <a:schemeClr val="lt1"/>
+              </a:solidFill>
+              <a:latin typeface="Lato"/>
+              <a:ea typeface="Lato"/>
+              <a:cs typeface="Lato"/>
+              <a:sym typeface="Lato"/>
+            </a:endParaRPr>
+          </a:p>
+          <a:p>
+            <a:pPr indent="0" lvl="0" marL="0" rtl="0" algn="l">
+              <a:spcBef>
+                <a:spcPts val="0"/>
+              </a:spcBef>
+              <a:spcAft>
+                <a:spcPts val="0"/>
+              </a:spcAft>
+              <a:buNone/>
+            </a:pPr>
+            <a:r>
+              <a:t/>
+            </a:r>
+            <a:endParaRPr sz="1300">
+              <a:solidFill>
+                <a:schemeClr val="lt1"/>
+              </a:solidFill>
+              <a:latin typeface="Lato"/>
+              <a:ea typeface="Lato"/>
+              <a:cs typeface="Lato"/>
+              <a:sym typeface="Lato"/>
+            </a:endParaRPr>
+          </a:p>
+          <a:p>
+            <a:pPr indent="0" lvl="0" marL="0" rtl="0" algn="l">
+              <a:spcBef>
+                <a:spcPts val="0"/>
+              </a:spcBef>
+              <a:spcAft>
+                <a:spcPts val="0"/>
+              </a:spcAft>
+              <a:buNone/>
+            </a:pPr>
+            <a:r>
+              <a:t/>
+            </a:r>
+            <a:endParaRPr sz="1300">
+              <a:solidFill>
+                <a:schemeClr val="lt1"/>
+              </a:solidFill>
+              <a:latin typeface="Lato"/>
+              <a:ea typeface="Lato"/>
+              <a:cs typeface="Lato"/>
+              <a:sym typeface="Lato"/>
+            </a:endParaRPr>
+          </a:p>
+        </p:txBody>
+      </p:sp>
+      <p:pic>
+        <p:nvPicPr>
+          <p:cNvPr id="191" name="Google Shape;191;p21"/>
+          <p:cNvPicPr preferRelativeResize="0"/>
+          <p:nvPr/>
+        </p:nvPicPr>
+        <p:blipFill>
+          <a:blip r:embed="rId3">
+            <a:alphaModFix/>
+          </a:blip>
+          <a:stretch>
+            <a:fillRect/>
+          </a:stretch>
+        </p:blipFill>
+        <p:spPr>
+          <a:xfrm>
+            <a:off x="2566663" y="230100"/>
+            <a:ext cx="4010680" cy="3482000"/>
+          </a:xfrm>
+          <a:prstGeom prst="rect">
+            <a:avLst/>
+          </a:prstGeom>
+          <a:noFill/>
+          <a:ln>
+            <a:noFill/>
+          </a:ln>
+        </p:spPr>
+      </p:pic>
     </p:spTree>
   </p:cSld>
   <p:clrMapOvr>
@@ -11090,6 +12343,285 @@
 </file>
 
 <file path=ppt/theme/theme1.xml><?xml version="1.0" encoding="utf-8"?>
+<a:theme xmlns:a="http://schemas.openxmlformats.org/drawingml/2006/main" xmlns:r="http://schemas.openxmlformats.org/officeDocument/2006/relationships">
+  <a:themeElements>
+    <a:clrScheme name="Default">
+      <a:dk1>
+        <a:srgbClr val="000000"/>
+      </a:dk1>
+      <a:lt1>
+        <a:srgbClr val="FFFFFF"/>
+      </a:lt1>
+      <a:dk2>
+        <a:srgbClr val="158158"/>
+      </a:dk2>
+      <a:lt2>
+        <a:srgbClr val="F3F3F3"/>
+      </a:lt2>
+      <a:accent1>
+        <a:srgbClr val="058DC7"/>
+      </a:accent1>
+      <a:accent2>
+        <a:srgbClr val="50B432"/>
+      </a:accent2>
+      <a:accent3>
+        <a:srgbClr val="ED561B"/>
+      </a:accent3>
+      <a:accent4>
+        <a:srgbClr val="EDEF00"/>
+      </a:accent4>
+      <a:accent5>
+        <a:srgbClr val="24CBE5"/>
+      </a:accent5>
+      <a:accent6>
+        <a:srgbClr val="64E572"/>
+      </a:accent6>
+      <a:hlink>
+        <a:srgbClr val="2200CC"/>
+      </a:hlink>
+      <a:folHlink>
+        <a:srgbClr val="551A8B"/>
+      </a:folHlink>
+    </a:clrScheme>
+    <a:fontScheme name="Office">
+      <a:majorFont>
+        <a:latin typeface="Arial"/>
+        <a:ea typeface=""/>
+        <a:cs typeface=""/>
+        <a:font script="Jpan" typeface="ＭＳ Ｐゴシック"/>
+        <a:font script="Hang" typeface="맑은 고딕"/>
+        <a:font script="Hans" typeface="宋体"/>
+        <a:font script="Hant" typeface="新細明體"/>
+        <a:font script="Arab" typeface="Times New Roman"/>
+        <a:font script="Hebr" typeface="Times New Roman"/>
+        <a:font script="Thai" typeface="Angsana New"/>
+        <a:font script="Ethi" typeface="Nyala"/>
+        <a:font script="Beng" typeface="Vrinda"/>
+        <a:font script="Gujr" typeface="Shruti"/>
+        <a:font script="Khmr" typeface="MoolBoran"/>
+        <a:font script="Knda" typeface="Tunga"/>
+        <a:font script="Guru" typeface="Raavi"/>
+        <a:font script="Cans" typeface="Euphemia"/>
+        <a:font script="Cher" typeface="Plantagenet Cherokee"/>
+        <a:font script="Yiii" typeface="Microsoft Yi Baiti"/>
+        <a:font script="Tibt" typeface="Microsoft Himalaya"/>
+        <a:font script="Thaa" typeface="MV Boli"/>
+        <a:font script="Deva" typeface="Mangal"/>
+        <a:font script="Telu" typeface="Gautami"/>
+        <a:font script="Taml" typeface="Latha"/>
+        <a:font script="Syrc" typeface="Estrangelo Edessa"/>
+        <a:font script="Orya" typeface="Kalinga"/>
+        <a:font script="Mlym" typeface="Kartika"/>
+        <a:font script="Laoo" typeface="DokChampa"/>
+        <a:font script="Sinh" typeface="Iskoola Pota"/>
+        <a:font script="Mong" typeface="Mongolian Baiti"/>
+        <a:font script="Viet" typeface="Times New Roman"/>
+        <a:font script="Uigh" typeface="Microsoft Uighur"/>
+        <a:font script="Geor" typeface="Sylfaen"/>
+      </a:majorFont>
+      <a:minorFont>
+        <a:latin typeface="Arial"/>
+        <a:ea typeface=""/>
+        <a:cs typeface=""/>
+        <a:font script="Jpan" typeface="ＭＳ Ｐゴシック"/>
+        <a:font script="Hang" typeface="맑은 고딕"/>
+        <a:font script="Hans" typeface="宋体"/>
+        <a:font script="Hant" typeface="新細明體"/>
+        <a:font script="Arab" typeface="Arial"/>
+        <a:font script="Hebr" typeface="Arial"/>
+        <a:font script="Thai" typeface="Cordia New"/>
+        <a:font script="Ethi" typeface="Nyala"/>
+        <a:font script="Beng" typeface="Vrinda"/>
+        <a:font script="Gujr" typeface="Shruti"/>
+        <a:font script="Khmr" typeface="DaunPenh"/>
+        <a:font script="Knda" typeface="Tunga"/>
+        <a:font script="Guru" typeface="Raavi"/>
+        <a:font script="Cans" typeface="Euphemia"/>
+        <a:font script="Cher" typeface="Plantagenet Cherokee"/>
+        <a:font script="Yiii" typeface="Microsoft Yi Baiti"/>
+        <a:font script="Tibt" typeface="Microsoft Himalaya"/>
+        <a:font script="Thaa" typeface="MV Boli"/>
+        <a:font script="Deva" typeface="Mangal"/>
+        <a:font script="Telu" typeface="Gautami"/>
+        <a:font script="Taml" typeface="Latha"/>
+        <a:font script="Syrc" typeface="Estrangelo Edessa"/>
+        <a:font script="Orya" typeface="Kalinga"/>
+        <a:font script="Mlym" typeface="Kartika"/>
+        <a:font script="Laoo" typeface="DokChampa"/>
+        <a:font script="Sinh" typeface="Iskoola Pota"/>
+        <a:font script="Mong" typeface="Mongolian Baiti"/>
+        <a:font script="Viet" typeface="Arial"/>
+        <a:font script="Uigh" typeface="Microsoft Uighur"/>
+        <a:font script="Geor" typeface="Sylfaen"/>
+      </a:minorFont>
+    </a:fontScheme>
+    <a:fmtScheme name="Office">
+      <a:fillStyleLst>
+        <a:solidFill>
+          <a:schemeClr val="phClr"/>
+        </a:solidFill>
+        <a:gradFill rotWithShape="1">
+          <a:gsLst>
+            <a:gs pos="0">
+              <a:schemeClr val="phClr">
+                <a:tint val="50000"/>
+                <a:satMod val="300000"/>
+              </a:schemeClr>
+            </a:gs>
+            <a:gs pos="35000">
+              <a:schemeClr val="phClr">
+                <a:tint val="37000"/>
+                <a:satMod val="300000"/>
+              </a:schemeClr>
+            </a:gs>
+            <a:gs pos="100000">
+              <a:schemeClr val="phClr">
+                <a:tint val="15000"/>
+                <a:satMod val="350000"/>
+              </a:schemeClr>
+            </a:gs>
+          </a:gsLst>
+          <a:lin ang="16200000" scaled="1"/>
+        </a:gradFill>
+        <a:gradFill rotWithShape="1">
+          <a:gsLst>
+            <a:gs pos="0">
+              <a:schemeClr val="phClr">
+                <a:tint val="100000"/>
+                <a:shade val="100000"/>
+                <a:satMod val="130000"/>
+              </a:schemeClr>
+            </a:gs>
+            <a:gs pos="100000">
+              <a:schemeClr val="phClr">
+                <a:tint val="50000"/>
+                <a:shade val="100000"/>
+                <a:satMod val="350000"/>
+              </a:schemeClr>
+            </a:gs>
+          </a:gsLst>
+          <a:lin ang="16200000" scaled="0"/>
+        </a:gradFill>
+      </a:fillStyleLst>
+      <a:lnStyleLst>
+        <a:ln w="9525" cap="flat" cmpd="sng" algn="ctr">
+          <a:solidFill>
+            <a:schemeClr val="phClr">
+              <a:shade val="95000"/>
+              <a:satMod val="105000"/>
+            </a:schemeClr>
+          </a:solidFill>
+          <a:prstDash val="solid"/>
+        </a:ln>
+        <a:ln w="25400" cap="flat" cmpd="sng" algn="ctr">
+          <a:solidFill>
+            <a:schemeClr val="phClr"/>
+          </a:solidFill>
+          <a:prstDash val="solid"/>
+        </a:ln>
+        <a:ln w="38100" cap="flat" cmpd="sng" algn="ctr">
+          <a:solidFill>
+            <a:schemeClr val="phClr"/>
+          </a:solidFill>
+          <a:prstDash val="solid"/>
+        </a:ln>
+      </a:lnStyleLst>
+      <a:effectStyleLst>
+        <a:effectStyle>
+          <a:effectLst>
+            <a:outerShdw blurRad="40000" dist="20000" dir="5400000" rotWithShape="0">
+              <a:srgbClr val="000000">
+                <a:alpha val="38000"/>
+              </a:srgbClr>
+            </a:outerShdw>
+          </a:effectLst>
+        </a:effectStyle>
+        <a:effectStyle>
+          <a:effectLst>
+            <a:outerShdw blurRad="40000" dist="23000" dir="5400000" rotWithShape="0">
+              <a:srgbClr val="000000">
+                <a:alpha val="35000"/>
+              </a:srgbClr>
+            </a:outerShdw>
+          </a:effectLst>
+        </a:effectStyle>
+        <a:effectStyle>
+          <a:effectLst>
+            <a:outerShdw blurRad="40000" dist="23000" dir="5400000" rotWithShape="0">
+              <a:srgbClr val="000000">
+                <a:alpha val="35000"/>
+              </a:srgbClr>
+            </a:outerShdw>
+          </a:effectLst>
+          <a:scene3d>
+            <a:camera prst="orthographicFront">
+              <a:rot lat="0" lon="0" rev="0"/>
+            </a:camera>
+            <a:lightRig rig="threePt" dir="t">
+              <a:rot lat="0" lon="0" rev="1200000"/>
+            </a:lightRig>
+          </a:scene3d>
+          <a:sp3d>
+            <a:bevelT w="63500" h="25400"/>
+          </a:sp3d>
+        </a:effectStyle>
+      </a:effectStyleLst>
+      <a:bgFillStyleLst>
+        <a:solidFill>
+          <a:schemeClr val="phClr"/>
+        </a:solidFill>
+        <a:gradFill rotWithShape="1">
+          <a:gsLst>
+            <a:gs pos="0">
+              <a:schemeClr val="phClr">
+                <a:tint val="40000"/>
+                <a:satMod val="350000"/>
+              </a:schemeClr>
+            </a:gs>
+            <a:gs pos="40000">
+              <a:schemeClr val="phClr">
+                <a:tint val="45000"/>
+                <a:shade val="99000"/>
+                <a:satMod val="350000"/>
+              </a:schemeClr>
+            </a:gs>
+            <a:gs pos="100000">
+              <a:schemeClr val="phClr">
+                <a:shade val="20000"/>
+                <a:satMod val="255000"/>
+              </a:schemeClr>
+            </a:gs>
+          </a:gsLst>
+          <a:path path="circle">
+            <a:fillToRect l="50000" t="-80000" r="50000" b="180000"/>
+          </a:path>
+        </a:gradFill>
+        <a:gradFill rotWithShape="1">
+          <a:gsLst>
+            <a:gs pos="0">
+              <a:schemeClr val="phClr">
+                <a:tint val="80000"/>
+                <a:satMod val="300000"/>
+              </a:schemeClr>
+            </a:gs>
+            <a:gs pos="100000">
+              <a:schemeClr val="phClr">
+                <a:shade val="30000"/>
+                <a:satMod val="200000"/>
+              </a:schemeClr>
+            </a:gs>
+          </a:gsLst>
+          <a:path path="circle">
+            <a:fillToRect l="50000" t="50000" r="50000" b="50000"/>
+          </a:path>
+        </a:gradFill>
+      </a:bgFillStyleLst>
+    </a:fmtScheme>
+  </a:themeElements>
+</a:theme>
+</file>
+
+<file path=ppt/theme/theme2.xml><?xml version="1.0" encoding="utf-8"?>
 <a:theme xmlns:a="http://schemas.openxmlformats.org/drawingml/2006/main" xmlns:r="http://schemas.openxmlformats.org/officeDocument/2006/relationships" name="Focus">
   <a:themeElements>
     <a:clrScheme name="Focus">
@@ -11366,283 +12898,4 @@
     </a:fmtScheme>
   </a:themeElements>
 </a:theme>
-</file>
-
-<file path=ppt/theme/theme2.xml><?xml version="1.0" encoding="utf-8"?>
-<a:theme xmlns:a="http://schemas.openxmlformats.org/drawingml/2006/main" xmlns:r="http://schemas.openxmlformats.org/officeDocument/2006/relationships">
-  <a:themeElements>
-    <a:clrScheme name="Default">
-      <a:dk1>
-        <a:srgbClr val="000000"/>
-      </a:dk1>
-      <a:lt1>
-        <a:srgbClr val="FFFFFF"/>
-      </a:lt1>
-      <a:dk2>
-        <a:srgbClr val="158158"/>
-      </a:dk2>
-      <a:lt2>
-        <a:srgbClr val="F3F3F3"/>
-      </a:lt2>
-      <a:accent1>
-        <a:srgbClr val="058DC7"/>
-      </a:accent1>
-      <a:accent2>
-        <a:srgbClr val="50B432"/>
-      </a:accent2>
-      <a:accent3>
-        <a:srgbClr val="ED561B"/>
-      </a:accent3>
-      <a:accent4>
-        <a:srgbClr val="EDEF00"/>
-      </a:accent4>
-      <a:accent5>
-        <a:srgbClr val="24CBE5"/>
-      </a:accent5>
-      <a:accent6>
-        <a:srgbClr val="64E572"/>
-      </a:accent6>
-      <a:hlink>
-        <a:srgbClr val="2200CC"/>
-      </a:hlink>
-      <a:folHlink>
-        <a:srgbClr val="551A8B"/>
-      </a:folHlink>
-    </a:clrScheme>
-    <a:fontScheme name="Office">
-      <a:majorFont>
-        <a:latin typeface="Arial"/>
-        <a:ea typeface=""/>
-        <a:cs typeface=""/>
-        <a:font script="Jpan" typeface="ＭＳ Ｐゴシック"/>
-        <a:font script="Hang" typeface="맑은 고딕"/>
-        <a:font script="Hans" typeface="宋体"/>
-        <a:font script="Hant" typeface="新細明體"/>
-        <a:font script="Arab" typeface="Times New Roman"/>
-        <a:font script="Hebr" typeface="Times New Roman"/>
-        <a:font script="Thai" typeface="Angsana New"/>
-        <a:font script="Ethi" typeface="Nyala"/>
-        <a:font script="Beng" typeface="Vrinda"/>
-        <a:font script="Gujr" typeface="Shruti"/>
-        <a:font script="Khmr" typeface="MoolBoran"/>
-        <a:font script="Knda" typeface="Tunga"/>
-        <a:font script="Guru" typeface="Raavi"/>
-        <a:font script="Cans" typeface="Euphemia"/>
-        <a:font script="Cher" typeface="Plantagenet Cherokee"/>
-        <a:font script="Yiii" typeface="Microsoft Yi Baiti"/>
-        <a:font script="Tibt" typeface="Microsoft Himalaya"/>
-        <a:font script="Thaa" typeface="MV Boli"/>
-        <a:font script="Deva" typeface="Mangal"/>
-        <a:font script="Telu" typeface="Gautami"/>
-        <a:font script="Taml" typeface="Latha"/>
-        <a:font script="Syrc" typeface="Estrangelo Edessa"/>
-        <a:font script="Orya" typeface="Kalinga"/>
-        <a:font script="Mlym" typeface="Kartika"/>
-        <a:font script="Laoo" typeface="DokChampa"/>
-        <a:font script="Sinh" typeface="Iskoola Pota"/>
-        <a:font script="Mong" typeface="Mongolian Baiti"/>
-        <a:font script="Viet" typeface="Times New Roman"/>
-        <a:font script="Uigh" typeface="Microsoft Uighur"/>
-        <a:font script="Geor" typeface="Sylfaen"/>
-      </a:majorFont>
-      <a:minorFont>
-        <a:latin typeface="Arial"/>
-        <a:ea typeface=""/>
-        <a:cs typeface=""/>
-        <a:font script="Jpan" typeface="ＭＳ Ｐゴシック"/>
-        <a:font script="Hang" typeface="맑은 고딕"/>
-        <a:font script="Hans" typeface="宋体"/>
-        <a:font script="Hant" typeface="新細明體"/>
-        <a:font script="Arab" typeface="Arial"/>
-        <a:font script="Hebr" typeface="Arial"/>
-        <a:font script="Thai" typeface="Cordia New"/>
-        <a:font script="Ethi" typeface="Nyala"/>
-        <a:font script="Beng" typeface="Vrinda"/>
-        <a:font script="Gujr" typeface="Shruti"/>
-        <a:font script="Khmr" typeface="DaunPenh"/>
-        <a:font script="Knda" typeface="Tunga"/>
-        <a:font script="Guru" typeface="Raavi"/>
-        <a:font script="Cans" typeface="Euphemia"/>
-        <a:font script="Cher" typeface="Plantagenet Cherokee"/>
-        <a:font script="Yiii" typeface="Microsoft Yi Baiti"/>
-        <a:font script="Tibt" typeface="Microsoft Himalaya"/>
-        <a:font script="Thaa" typeface="MV Boli"/>
-        <a:font script="Deva" typeface="Mangal"/>
-        <a:font script="Telu" typeface="Gautami"/>
-        <a:font script="Taml" typeface="Latha"/>
-        <a:font script="Syrc" typeface="Estrangelo Edessa"/>
-        <a:font script="Orya" typeface="Kalinga"/>
-        <a:font script="Mlym" typeface="Kartika"/>
-        <a:font script="Laoo" typeface="DokChampa"/>
-        <a:font script="Sinh" typeface="Iskoola Pota"/>
-        <a:font script="Mong" typeface="Mongolian Baiti"/>
-        <a:font script="Viet" typeface="Arial"/>
-        <a:font script="Uigh" typeface="Microsoft Uighur"/>
-        <a:font script="Geor" typeface="Sylfaen"/>
-      </a:minorFont>
-    </a:fontScheme>
-    <a:fmtScheme name="Office">
-      <a:fillStyleLst>
-        <a:solidFill>
-          <a:schemeClr val="phClr"/>
-        </a:solidFill>
-        <a:gradFill rotWithShape="1">
-          <a:gsLst>
-            <a:gs pos="0">
-              <a:schemeClr val="phClr">
-                <a:tint val="50000"/>
-                <a:satMod val="300000"/>
-              </a:schemeClr>
-            </a:gs>
-            <a:gs pos="35000">
-              <a:schemeClr val="phClr">
-                <a:tint val="37000"/>
-                <a:satMod val="300000"/>
-              </a:schemeClr>
-            </a:gs>
-            <a:gs pos="100000">
-              <a:schemeClr val="phClr">
-                <a:tint val="15000"/>
-                <a:satMod val="350000"/>
-              </a:schemeClr>
-            </a:gs>
-          </a:gsLst>
-          <a:lin ang="16200000" scaled="1"/>
-        </a:gradFill>
-        <a:gradFill rotWithShape="1">
-          <a:gsLst>
-            <a:gs pos="0">
-              <a:schemeClr val="phClr">
-                <a:tint val="100000"/>
-                <a:shade val="100000"/>
-                <a:satMod val="130000"/>
-              </a:schemeClr>
-            </a:gs>
-            <a:gs pos="100000">
-              <a:schemeClr val="phClr">
-                <a:tint val="50000"/>
-                <a:shade val="100000"/>
-                <a:satMod val="350000"/>
-              </a:schemeClr>
-            </a:gs>
-          </a:gsLst>
-          <a:lin ang="16200000" scaled="0"/>
-        </a:gradFill>
-      </a:fillStyleLst>
-      <a:lnStyleLst>
-        <a:ln w="9525" cap="flat" cmpd="sng" algn="ctr">
-          <a:solidFill>
-            <a:schemeClr val="phClr">
-              <a:shade val="95000"/>
-              <a:satMod val="105000"/>
-            </a:schemeClr>
-          </a:solidFill>
-          <a:prstDash val="solid"/>
-        </a:ln>
-        <a:ln w="25400" cap="flat" cmpd="sng" algn="ctr">
-          <a:solidFill>
-            <a:schemeClr val="phClr"/>
-          </a:solidFill>
-          <a:prstDash val="solid"/>
-        </a:ln>
-        <a:ln w="38100" cap="flat" cmpd="sng" algn="ctr">
-          <a:solidFill>
-            <a:schemeClr val="phClr"/>
-          </a:solidFill>
-          <a:prstDash val="solid"/>
-        </a:ln>
-      </a:lnStyleLst>
-      <a:effectStyleLst>
-        <a:effectStyle>
-          <a:effectLst>
-            <a:outerShdw blurRad="40000" dist="20000" dir="5400000" rotWithShape="0">
-              <a:srgbClr val="000000">
-                <a:alpha val="38000"/>
-              </a:srgbClr>
-            </a:outerShdw>
-          </a:effectLst>
-        </a:effectStyle>
-        <a:effectStyle>
-          <a:effectLst>
-            <a:outerShdw blurRad="40000" dist="23000" dir="5400000" rotWithShape="0">
-              <a:srgbClr val="000000">
-                <a:alpha val="35000"/>
-              </a:srgbClr>
-            </a:outerShdw>
-          </a:effectLst>
-        </a:effectStyle>
-        <a:effectStyle>
-          <a:effectLst>
-            <a:outerShdw blurRad="40000" dist="23000" dir="5400000" rotWithShape="0">
-              <a:srgbClr val="000000">
-                <a:alpha val="35000"/>
-              </a:srgbClr>
-            </a:outerShdw>
-          </a:effectLst>
-          <a:scene3d>
-            <a:camera prst="orthographicFront">
-              <a:rot lat="0" lon="0" rev="0"/>
-            </a:camera>
-            <a:lightRig rig="threePt" dir="t">
-              <a:rot lat="0" lon="0" rev="1200000"/>
-            </a:lightRig>
-          </a:scene3d>
-          <a:sp3d>
-            <a:bevelT w="63500" h="25400"/>
-          </a:sp3d>
-        </a:effectStyle>
-      </a:effectStyleLst>
-      <a:bgFillStyleLst>
-        <a:solidFill>
-          <a:schemeClr val="phClr"/>
-        </a:solidFill>
-        <a:gradFill rotWithShape="1">
-          <a:gsLst>
-            <a:gs pos="0">
-              <a:schemeClr val="phClr">
-                <a:tint val="40000"/>
-                <a:satMod val="350000"/>
-              </a:schemeClr>
-            </a:gs>
-            <a:gs pos="40000">
-              <a:schemeClr val="phClr">
-                <a:tint val="45000"/>
-                <a:shade val="99000"/>
-                <a:satMod val="350000"/>
-              </a:schemeClr>
-            </a:gs>
-            <a:gs pos="100000">
-              <a:schemeClr val="phClr">
-                <a:shade val="20000"/>
-                <a:satMod val="255000"/>
-              </a:schemeClr>
-            </a:gs>
-          </a:gsLst>
-          <a:path path="circle">
-            <a:fillToRect l="50000" t="-80000" r="50000" b="180000"/>
-          </a:path>
-        </a:gradFill>
-        <a:gradFill rotWithShape="1">
-          <a:gsLst>
-            <a:gs pos="0">
-              <a:schemeClr val="phClr">
-                <a:tint val="80000"/>
-                <a:satMod val="300000"/>
-              </a:schemeClr>
-            </a:gs>
-            <a:gs pos="100000">
-              <a:schemeClr val="phClr">
-                <a:shade val="30000"/>
-                <a:satMod val="200000"/>
-              </a:schemeClr>
-            </a:gs>
-          </a:gsLst>
-          <a:path path="circle">
-            <a:fillToRect l="50000" t="50000" r="50000" b="50000"/>
-          </a:path>
-        </a:gradFill>
-      </a:bgFillStyleLst>
-    </a:fmtScheme>
-  </a:themeElements>
-</a:theme>
 </file>
</xml_diff>